<commit_message>
Updating Google Drive Files
</commit_message>
<xml_diff>
--- a/google-drive/week03/2Tues/2_LAsBEST TEMPLATE.pptx
+++ b/google-drive/week03/2Tues/2_LAsBEST TEMPLATE.pptx
@@ -5567,586 +5567,6 @@
           </a:p>
         </p:txBody>
       </p:sp>
-      <p:sp>
-        <p:nvSpPr>
-          <p:cNvPr id="18437" name="Text Box 22"/>
-          <p:cNvSpPr txBox="1">
-            <a:spLocks noChangeArrowheads="1"/>
-          </p:cNvSpPr>
-          <p:nvPr/>
-        </p:nvSpPr>
-        <p:spPr bwMode="auto">
-          <a:xfrm>
-            <a:off x="12078850" y="28688809"/>
-            <a:ext cx="29425900" cy="2139047"/>
-          </a:xfrm>
-          <a:prstGeom prst="rect">
-            <a:avLst/>
-          </a:prstGeom>
-          <a:noFill/>
-          <a:ln w="127000">
-            <a:noFill/>
-            <a:miter lim="800000"/>
-            <a:headEnd/>
-            <a:tailEnd/>
-          </a:ln>
-        </p:spPr>
-        <p:txBody>
-          <a:bodyPr wrap="square">
-            <a:spAutoFit/>
-          </a:bodyPr>
-          <a:lstStyle/>
-          <a:p>
-            <a:pPr eaLnBrk="1" hangingPunct="1"/>
-            <a:r>
-              <a:rPr lang="en-GB" b="1" dirty="0">
-                <a:latin typeface="Arial" panose="020B0604020202020204" pitchFamily="34" charset="0"/>
-                <a:cs typeface="Arial" pitchFamily="34" charset="0"/>
-              </a:rPr>
-              <a:t>Acknowledgements:</a:t>
-            </a:r>
-            <a:r>
-              <a:rPr lang="en-CA" b="1" dirty="0">
-                <a:latin typeface="Arial" panose="020B0604020202020204" pitchFamily="34" charset="0"/>
-                <a:cs typeface="Arial" pitchFamily="34" charset="0"/>
-              </a:rPr>
-              <a:t> </a:t>
-            </a:r>
-            <a:r>
-              <a:rPr lang="en-CA" dirty="0">
-                <a:latin typeface="Arial" panose="020B0604020202020204" pitchFamily="34" charset="0"/>
-                <a:cs typeface="Arial" pitchFamily="34" charset="0"/>
-              </a:rPr>
-              <a:t>This project was funded under the Summer Institutes in Biostatistics (SIBS) program of the National Heart, Lung, and Blood Institute grant # R25HL147236, with additional support from the Keck School of Medicine of USC, USC Norris Comprehensive Cancer Center grant # P30CA014089 </a:t>
-            </a:r>
-            <a:r>
-              <a:rPr lang="en-US" dirty="0">
-                <a:latin typeface="Arial" pitchFamily="34" charset="0"/>
-                <a:cs typeface="Arial" pitchFamily="34" charset="0"/>
-              </a:rPr>
-              <a:t>and National Institute of Environmental Health Sciences Center, grant # 5P30ES07048.</a:t>
-            </a:r>
-          </a:p>
-          <a:p>
-            <a:pPr algn="ctr" eaLnBrk="1" hangingPunct="1"/>
-            <a:endParaRPr lang="en-US" dirty="0">
-              <a:latin typeface="Arial" pitchFamily="34" charset="0"/>
-              <a:cs typeface="Arial" pitchFamily="34" charset="0"/>
-            </a:endParaRPr>
-          </a:p>
-          <a:p>
-            <a:pPr eaLnBrk="1" hangingPunct="1"/>
-            <a:r>
-              <a:rPr lang="en-US" b="1" dirty="0">
-                <a:latin typeface="Arial" panose="020B0604020202020204" pitchFamily="34" charset="0"/>
-                <a:cs typeface="Arial" pitchFamily="34" charset="0"/>
-              </a:rPr>
-              <a:t>Disclaimer: </a:t>
-            </a:r>
-            <a:r>
-              <a:rPr lang="en-US" dirty="0">
-                <a:latin typeface="Arial" panose="020B0604020202020204" pitchFamily="34" charset="0"/>
-                <a:cs typeface="Arial" pitchFamily="34" charset="0"/>
-              </a:rPr>
-              <a:t>Note that the results on this poster are based on a dataset that includes only a non-representative sample from the actual Southern California Children’s Health Study. Hence, it is solely intended for instructional purposes and should not be used to draw definitive (and substantively meaningful) conclusions about actual study objectives. </a:t>
-            </a:r>
-            <a:endParaRPr lang="en-GB" dirty="0">
-              <a:latin typeface="Arial" panose="020B0604020202020204" pitchFamily="34" charset="0"/>
-              <a:cs typeface="Arial" pitchFamily="34" charset="0"/>
-            </a:endParaRPr>
-          </a:p>
-          <a:p>
-            <a:pPr marL="479425" eaLnBrk="1" hangingPunct="1"/>
-            <a:endParaRPr lang="en-US" sz="800" b="1" dirty="0">
-              <a:latin typeface="Arial" pitchFamily="34" charset="0"/>
-            </a:endParaRPr>
-          </a:p>
-        </p:txBody>
-      </p:sp>
-      <p:sp>
-        <p:nvSpPr>
-          <p:cNvPr id="18438" name="Text Box 23"/>
-          <p:cNvSpPr txBox="1">
-            <a:spLocks noChangeArrowheads="1"/>
-          </p:cNvSpPr>
-          <p:nvPr/>
-        </p:nvSpPr>
-        <p:spPr bwMode="auto">
-          <a:xfrm>
-            <a:off x="417378" y="5367207"/>
-            <a:ext cx="11074400" cy="25268456"/>
-          </a:xfrm>
-          <a:prstGeom prst="rect">
-            <a:avLst/>
-          </a:prstGeom>
-          <a:noFill/>
-          <a:ln w="127000">
-            <a:solidFill>
-              <a:srgbClr val="C0C0C0"/>
-            </a:solidFill>
-            <a:miter lim="800000"/>
-            <a:headEnd/>
-            <a:tailEnd/>
-          </a:ln>
-        </p:spPr>
-        <p:txBody>
-          <a:bodyPr>
-            <a:spAutoFit/>
-          </a:bodyPr>
-          <a:lstStyle/>
-          <a:p>
-            <a:pPr marL="479425">
-              <a:spcAft>
-                <a:spcPts val="0"/>
-              </a:spcAft>
-            </a:pPr>
-            <a:endParaRPr lang="en-US" sz="4000" b="1" u="sng" dirty="0">
-              <a:latin typeface="Arial" pitchFamily="34" charset="0"/>
-              <a:cs typeface="Arial" pitchFamily="34" charset="0"/>
-            </a:endParaRPr>
-          </a:p>
-          <a:p>
-            <a:pPr marL="479425">
-              <a:spcAft>
-                <a:spcPts val="0"/>
-              </a:spcAft>
-            </a:pPr>
-            <a:endParaRPr lang="en-US" sz="4000" b="1" u="sng" dirty="0">
-              <a:latin typeface="Arial" pitchFamily="34" charset="0"/>
-              <a:cs typeface="Arial" pitchFamily="34" charset="0"/>
-            </a:endParaRPr>
-          </a:p>
-          <a:p>
-            <a:pPr marL="479425">
-              <a:spcAft>
-                <a:spcPts val="0"/>
-              </a:spcAft>
-            </a:pPr>
-            <a:endParaRPr lang="en-US" sz="4000" b="1" u="sng" dirty="0">
-              <a:latin typeface="Arial" pitchFamily="34" charset="0"/>
-              <a:cs typeface="Arial" pitchFamily="34" charset="0"/>
-            </a:endParaRPr>
-          </a:p>
-          <a:p>
-            <a:pPr marL="479425">
-              <a:spcAft>
-                <a:spcPts val="0"/>
-              </a:spcAft>
-            </a:pPr>
-            <a:endParaRPr lang="en-US" sz="4000" b="1" u="sng" dirty="0">
-              <a:latin typeface="Arial" pitchFamily="34" charset="0"/>
-              <a:cs typeface="Arial" pitchFamily="34" charset="0"/>
-            </a:endParaRPr>
-          </a:p>
-          <a:p>
-            <a:pPr marL="479425">
-              <a:spcAft>
-                <a:spcPts val="0"/>
-              </a:spcAft>
-            </a:pPr>
-            <a:endParaRPr lang="en-US" sz="4000" b="1" u="sng" dirty="0">
-              <a:latin typeface="Arial" pitchFamily="34" charset="0"/>
-              <a:cs typeface="Arial" pitchFamily="34" charset="0"/>
-            </a:endParaRPr>
-          </a:p>
-          <a:p>
-            <a:pPr marL="479425">
-              <a:spcAft>
-                <a:spcPts val="0"/>
-              </a:spcAft>
-            </a:pPr>
-            <a:endParaRPr lang="en-US" sz="4000" b="1" u="sng" dirty="0">
-              <a:latin typeface="Arial" pitchFamily="34" charset="0"/>
-              <a:cs typeface="Arial" pitchFamily="34" charset="0"/>
-            </a:endParaRPr>
-          </a:p>
-          <a:p>
-            <a:pPr marL="479425">
-              <a:spcAft>
-                <a:spcPts val="0"/>
-              </a:spcAft>
-            </a:pPr>
-            <a:endParaRPr lang="en-US" sz="4000" b="1" u="sng" dirty="0">
-              <a:latin typeface="Arial" pitchFamily="34" charset="0"/>
-              <a:cs typeface="Arial" pitchFamily="34" charset="0"/>
-            </a:endParaRPr>
-          </a:p>
-          <a:p>
-            <a:pPr marL="479425">
-              <a:spcAft>
-                <a:spcPts val="0"/>
-              </a:spcAft>
-            </a:pPr>
-            <a:endParaRPr lang="en-US" sz="4000" b="1" u="sng" dirty="0">
-              <a:latin typeface="Arial" pitchFamily="34" charset="0"/>
-              <a:cs typeface="Arial" pitchFamily="34" charset="0"/>
-            </a:endParaRPr>
-          </a:p>
-          <a:p>
-            <a:pPr marL="479425">
-              <a:spcAft>
-                <a:spcPts val="0"/>
-              </a:spcAft>
-            </a:pPr>
-            <a:endParaRPr lang="en-US" sz="4000" b="1" u="sng" dirty="0">
-              <a:latin typeface="Arial" pitchFamily="34" charset="0"/>
-              <a:cs typeface="Arial" pitchFamily="34" charset="0"/>
-            </a:endParaRPr>
-          </a:p>
-          <a:p>
-            <a:pPr marL="479425">
-              <a:spcAft>
-                <a:spcPts val="0"/>
-              </a:spcAft>
-            </a:pPr>
-            <a:endParaRPr lang="en-US" sz="4000" b="1" u="sng" dirty="0">
-              <a:latin typeface="Arial" pitchFamily="34" charset="0"/>
-              <a:cs typeface="Arial" pitchFamily="34" charset="0"/>
-            </a:endParaRPr>
-          </a:p>
-          <a:p>
-            <a:pPr marL="479425">
-              <a:spcAft>
-                <a:spcPts val="0"/>
-              </a:spcAft>
-            </a:pPr>
-            <a:endParaRPr lang="en-US" sz="4000" b="1" u="sng" dirty="0">
-              <a:latin typeface="Arial" pitchFamily="34" charset="0"/>
-              <a:cs typeface="Arial" pitchFamily="34" charset="0"/>
-            </a:endParaRPr>
-          </a:p>
-          <a:p>
-            <a:pPr marL="479425">
-              <a:spcAft>
-                <a:spcPts val="0"/>
-              </a:spcAft>
-            </a:pPr>
-            <a:endParaRPr lang="en-US" sz="4000" b="1" u="sng" dirty="0">
-              <a:latin typeface="Arial" pitchFamily="34" charset="0"/>
-              <a:cs typeface="Arial" pitchFamily="34" charset="0"/>
-            </a:endParaRPr>
-          </a:p>
-          <a:p>
-            <a:pPr marL="479425">
-              <a:spcAft>
-                <a:spcPts val="0"/>
-              </a:spcAft>
-            </a:pPr>
-            <a:endParaRPr lang="en-US" sz="4000" b="1" u="sng" dirty="0">
-              <a:latin typeface="Arial" pitchFamily="34" charset="0"/>
-              <a:cs typeface="Arial" pitchFamily="34" charset="0"/>
-            </a:endParaRPr>
-          </a:p>
-          <a:p>
-            <a:pPr marL="479425">
-              <a:spcAft>
-                <a:spcPts val="0"/>
-              </a:spcAft>
-            </a:pPr>
-            <a:endParaRPr lang="en-US" sz="4000" b="1" u="sng" dirty="0">
-              <a:latin typeface="Arial" pitchFamily="34" charset="0"/>
-              <a:cs typeface="Arial" pitchFamily="34" charset="0"/>
-            </a:endParaRPr>
-          </a:p>
-          <a:p>
-            <a:pPr marL="479425">
-              <a:spcAft>
-                <a:spcPts val="0"/>
-              </a:spcAft>
-            </a:pPr>
-            <a:endParaRPr lang="en-US" sz="4000" b="1" u="sng" dirty="0">
-              <a:latin typeface="Arial" pitchFamily="34" charset="0"/>
-              <a:cs typeface="Arial" pitchFamily="34" charset="0"/>
-            </a:endParaRPr>
-          </a:p>
-          <a:p>
-            <a:pPr marL="479425">
-              <a:spcAft>
-                <a:spcPts val="0"/>
-              </a:spcAft>
-            </a:pPr>
-            <a:endParaRPr lang="en-US" sz="4000" b="1" u="sng" dirty="0">
-              <a:latin typeface="Arial" pitchFamily="34" charset="0"/>
-              <a:cs typeface="Arial" pitchFamily="34" charset="0"/>
-            </a:endParaRPr>
-          </a:p>
-          <a:p>
-            <a:pPr marL="479425">
-              <a:spcAft>
-                <a:spcPts val="0"/>
-              </a:spcAft>
-            </a:pPr>
-            <a:endParaRPr lang="en-US" sz="4000" b="1" u="sng" dirty="0">
-              <a:latin typeface="Arial" pitchFamily="34" charset="0"/>
-              <a:cs typeface="Arial" pitchFamily="34" charset="0"/>
-            </a:endParaRPr>
-          </a:p>
-          <a:p>
-            <a:pPr marL="479425">
-              <a:spcAft>
-                <a:spcPts val="0"/>
-              </a:spcAft>
-            </a:pPr>
-            <a:endParaRPr lang="en-US" sz="4000" b="1" u="sng" dirty="0">
-              <a:latin typeface="Arial" pitchFamily="34" charset="0"/>
-              <a:cs typeface="Arial" pitchFamily="34" charset="0"/>
-            </a:endParaRPr>
-          </a:p>
-          <a:p>
-            <a:pPr marL="479425">
-              <a:spcAft>
-                <a:spcPts val="0"/>
-              </a:spcAft>
-            </a:pPr>
-            <a:endParaRPr lang="en-US" sz="4000" b="1" u="sng" dirty="0">
-              <a:latin typeface="Arial" pitchFamily="34" charset="0"/>
-              <a:cs typeface="Arial" pitchFamily="34" charset="0"/>
-            </a:endParaRPr>
-          </a:p>
-          <a:p>
-            <a:pPr marL="479425">
-              <a:spcAft>
-                <a:spcPts val="0"/>
-              </a:spcAft>
-            </a:pPr>
-            <a:endParaRPr lang="en-US" sz="4000" b="1" u="sng" dirty="0">
-              <a:latin typeface="Arial" pitchFamily="34" charset="0"/>
-              <a:cs typeface="Arial" pitchFamily="34" charset="0"/>
-            </a:endParaRPr>
-          </a:p>
-          <a:p>
-            <a:pPr marL="479425">
-              <a:spcAft>
-                <a:spcPts val="0"/>
-              </a:spcAft>
-            </a:pPr>
-            <a:endParaRPr lang="en-US" sz="4000" b="1" u="sng" dirty="0">
-              <a:latin typeface="Arial" pitchFamily="34" charset="0"/>
-              <a:cs typeface="Arial" pitchFamily="34" charset="0"/>
-            </a:endParaRPr>
-          </a:p>
-          <a:p>
-            <a:pPr marL="479425">
-              <a:spcAft>
-                <a:spcPts val="0"/>
-              </a:spcAft>
-            </a:pPr>
-            <a:endParaRPr lang="en-US" sz="4000" b="1" u="sng" dirty="0">
-              <a:latin typeface="Arial" pitchFamily="34" charset="0"/>
-              <a:cs typeface="Arial" pitchFamily="34" charset="0"/>
-            </a:endParaRPr>
-          </a:p>
-          <a:p>
-            <a:pPr marL="479425">
-              <a:spcAft>
-                <a:spcPts val="0"/>
-              </a:spcAft>
-            </a:pPr>
-            <a:endParaRPr lang="en-US" sz="4000" b="1" u="sng" dirty="0">
-              <a:latin typeface="Arial" pitchFamily="34" charset="0"/>
-              <a:cs typeface="Arial" pitchFamily="34" charset="0"/>
-            </a:endParaRPr>
-          </a:p>
-          <a:p>
-            <a:pPr marL="479425">
-              <a:spcAft>
-                <a:spcPts val="0"/>
-              </a:spcAft>
-            </a:pPr>
-            <a:endParaRPr lang="en-US" sz="4000" b="1" u="sng" dirty="0">
-              <a:latin typeface="Arial" pitchFamily="34" charset="0"/>
-              <a:cs typeface="Arial" pitchFamily="34" charset="0"/>
-            </a:endParaRPr>
-          </a:p>
-          <a:p>
-            <a:pPr marL="479425">
-              <a:spcAft>
-                <a:spcPts val="0"/>
-              </a:spcAft>
-            </a:pPr>
-            <a:endParaRPr lang="en-US" sz="4000" b="1" u="sng" dirty="0">
-              <a:latin typeface="Arial" pitchFamily="34" charset="0"/>
-              <a:cs typeface="Arial" pitchFamily="34" charset="0"/>
-            </a:endParaRPr>
-          </a:p>
-          <a:p>
-            <a:pPr marL="479425">
-              <a:spcAft>
-                <a:spcPts val="0"/>
-              </a:spcAft>
-            </a:pPr>
-            <a:endParaRPr lang="en-US" sz="4000" b="1" u="sng" dirty="0">
-              <a:latin typeface="Arial" pitchFamily="34" charset="0"/>
-              <a:cs typeface="Arial" pitchFamily="34" charset="0"/>
-            </a:endParaRPr>
-          </a:p>
-          <a:p>
-            <a:pPr marL="479425">
-              <a:spcAft>
-                <a:spcPts val="0"/>
-              </a:spcAft>
-            </a:pPr>
-            <a:endParaRPr lang="en-US" sz="4000" b="1" u="sng" dirty="0">
-              <a:latin typeface="Arial" pitchFamily="34" charset="0"/>
-              <a:cs typeface="Arial" pitchFamily="34" charset="0"/>
-            </a:endParaRPr>
-          </a:p>
-          <a:p>
-            <a:pPr marL="479425">
-              <a:spcAft>
-                <a:spcPts val="0"/>
-              </a:spcAft>
-            </a:pPr>
-            <a:endParaRPr lang="en-US" sz="4000" b="1" u="sng" dirty="0">
-              <a:latin typeface="Arial" pitchFamily="34" charset="0"/>
-              <a:cs typeface="Arial" pitchFamily="34" charset="0"/>
-            </a:endParaRPr>
-          </a:p>
-          <a:p>
-            <a:pPr marL="479425">
-              <a:spcAft>
-                <a:spcPts val="0"/>
-              </a:spcAft>
-            </a:pPr>
-            <a:endParaRPr lang="en-US" sz="4000" b="1" u="sng" dirty="0">
-              <a:latin typeface="Arial" pitchFamily="34" charset="0"/>
-              <a:cs typeface="Arial" pitchFamily="34" charset="0"/>
-            </a:endParaRPr>
-          </a:p>
-          <a:p>
-            <a:pPr marL="479425">
-              <a:spcAft>
-                <a:spcPts val="0"/>
-              </a:spcAft>
-            </a:pPr>
-            <a:endParaRPr lang="en-US" sz="4000" b="1" u="sng" dirty="0">
-              <a:latin typeface="Arial" pitchFamily="34" charset="0"/>
-              <a:cs typeface="Arial" pitchFamily="34" charset="0"/>
-            </a:endParaRPr>
-          </a:p>
-          <a:p>
-            <a:pPr marL="479425">
-              <a:spcAft>
-                <a:spcPts val="0"/>
-              </a:spcAft>
-            </a:pPr>
-            <a:endParaRPr lang="en-US" sz="4000" b="1" u="sng" dirty="0">
-              <a:latin typeface="Arial" pitchFamily="34" charset="0"/>
-              <a:cs typeface="Arial" pitchFamily="34" charset="0"/>
-            </a:endParaRPr>
-          </a:p>
-          <a:p>
-            <a:pPr marL="479425">
-              <a:spcAft>
-                <a:spcPts val="0"/>
-              </a:spcAft>
-            </a:pPr>
-            <a:endParaRPr lang="en-US" sz="4000" b="1" u="sng" dirty="0">
-              <a:latin typeface="Arial" pitchFamily="34" charset="0"/>
-              <a:cs typeface="Arial" pitchFamily="34" charset="0"/>
-            </a:endParaRPr>
-          </a:p>
-          <a:p>
-            <a:pPr marL="479425">
-              <a:spcAft>
-                <a:spcPts val="0"/>
-              </a:spcAft>
-            </a:pPr>
-            <a:endParaRPr lang="en-US" sz="4000" b="1" u="sng" dirty="0">
-              <a:latin typeface="Arial" pitchFamily="34" charset="0"/>
-              <a:cs typeface="Arial" pitchFamily="34" charset="0"/>
-            </a:endParaRPr>
-          </a:p>
-          <a:p>
-            <a:pPr marL="479425">
-              <a:spcAft>
-                <a:spcPts val="0"/>
-              </a:spcAft>
-            </a:pPr>
-            <a:endParaRPr lang="en-US" sz="4000" b="1" u="sng" dirty="0">
-              <a:latin typeface="Arial" pitchFamily="34" charset="0"/>
-              <a:cs typeface="Arial" pitchFamily="34" charset="0"/>
-            </a:endParaRPr>
-          </a:p>
-          <a:p>
-            <a:pPr marL="479425">
-              <a:spcAft>
-                <a:spcPts val="0"/>
-              </a:spcAft>
-            </a:pPr>
-            <a:endParaRPr lang="en-US" sz="4000" b="1" u="sng" dirty="0">
-              <a:latin typeface="Arial" pitchFamily="34" charset="0"/>
-              <a:cs typeface="Arial" pitchFamily="34" charset="0"/>
-            </a:endParaRPr>
-          </a:p>
-          <a:p>
-            <a:pPr marL="479425">
-              <a:spcAft>
-                <a:spcPts val="0"/>
-              </a:spcAft>
-            </a:pPr>
-            <a:endParaRPr lang="en-US" sz="4000" b="1" u="sng" dirty="0">
-              <a:latin typeface="Arial" pitchFamily="34" charset="0"/>
-              <a:cs typeface="Arial" pitchFamily="34" charset="0"/>
-            </a:endParaRPr>
-          </a:p>
-          <a:p>
-            <a:pPr marL="479425">
-              <a:spcAft>
-                <a:spcPts val="0"/>
-              </a:spcAft>
-            </a:pPr>
-            <a:endParaRPr lang="en-US" sz="4000" b="1" u="sng" dirty="0">
-              <a:latin typeface="Arial" pitchFamily="34" charset="0"/>
-              <a:cs typeface="Arial" pitchFamily="34" charset="0"/>
-            </a:endParaRPr>
-          </a:p>
-          <a:p>
-            <a:pPr marL="479425">
-              <a:spcAft>
-                <a:spcPts val="0"/>
-              </a:spcAft>
-            </a:pPr>
-            <a:endParaRPr lang="en-US" sz="4000" b="1" u="sng" dirty="0">
-              <a:latin typeface="Arial" pitchFamily="34" charset="0"/>
-              <a:cs typeface="Arial" pitchFamily="34" charset="0"/>
-            </a:endParaRPr>
-          </a:p>
-          <a:p>
-            <a:pPr marL="479425">
-              <a:spcAft>
-                <a:spcPts val="0"/>
-              </a:spcAft>
-            </a:pPr>
-            <a:endParaRPr lang="en-US" sz="4000" b="1" u="sng" dirty="0">
-              <a:latin typeface="Arial" pitchFamily="34" charset="0"/>
-              <a:cs typeface="Arial" pitchFamily="34" charset="0"/>
-            </a:endParaRPr>
-          </a:p>
-          <a:p>
-            <a:pPr marL="479425">
-              <a:spcAft>
-                <a:spcPts val="0"/>
-              </a:spcAft>
-            </a:pPr>
-            <a:endParaRPr lang="en-US" sz="4000" b="1" u="sng" dirty="0">
-              <a:latin typeface="Arial" pitchFamily="34" charset="0"/>
-              <a:cs typeface="Arial" pitchFamily="34" charset="0"/>
-            </a:endParaRPr>
-          </a:p>
-          <a:p>
-            <a:pPr marL="479425">
-              <a:spcAft>
-                <a:spcPts val="1200"/>
-              </a:spcAft>
-            </a:pPr>
-            <a:endParaRPr lang="en-US" sz="3600" dirty="0">
-              <a:latin typeface="Arial" pitchFamily="34" charset="0"/>
-              <a:cs typeface="Arial" pitchFamily="34" charset="0"/>
-            </a:endParaRPr>
-          </a:p>
-        </p:txBody>
-      </p:sp>
       <p:pic>
         <p:nvPicPr>
           <p:cNvPr id="18445" name="Picture 12" descr="InfMonoWord_Vert_CardOnTrans.eps"/>
@@ -6195,7 +5615,7 @@
           <a:graphicData uri="http://schemas.openxmlformats.org/presentationml/2006/ole">
             <mc:AlternateContent xmlns:mc="http://schemas.openxmlformats.org/markup-compatibility/2006">
               <mc:Choice xmlns:v="urn:schemas-microsoft-com:vml" Requires="v">
-                <p:oleObj spid="_x0000_s18656" name="Equation" r:id="rId5" imgW="100440" imgH="155160" progId="Equation.3">
+                <p:oleObj spid="_x0000_s18666" name="Equation" r:id="rId5" imgW="100440" imgH="155160" progId="Equation.3">
                   <p:embed/>
                 </p:oleObj>
               </mc:Choice>
@@ -6234,7 +5654,7 @@
                       <a:noFill/>
                       <a:extLst>
                         <a:ext uri="{909E8E84-426E-40dd-AFC4-6F175D3DCCD1}">
-                          <a14:hiddenFill xmlns="" xmlns:a14="http://schemas.microsoft.com/office/drawing/2010/main">
+                          <a14:hiddenFill xmlns:a14="http://schemas.microsoft.com/office/drawing/2010/main" xmlns="">
                             <a:solidFill>
                               <a:srgbClr val="FFFFFF"/>
                             </a:solidFill>
@@ -6409,53 +5829,6 @@
       </p:sp>
       <p:sp>
         <p:nvSpPr>
-          <p:cNvPr id="20" name="Rectangle 19"/>
-          <p:cNvSpPr/>
-          <p:nvPr/>
-        </p:nvSpPr>
-        <p:spPr>
-          <a:xfrm>
-            <a:off x="35599784" y="19372521"/>
-            <a:ext cx="3551274" cy="467832"/>
-          </a:xfrm>
-          <a:prstGeom prst="rect">
-            <a:avLst/>
-          </a:prstGeom>
-          <a:solidFill>
-            <a:schemeClr val="bg1"/>
-          </a:solidFill>
-          <a:ln>
-            <a:solidFill>
-              <a:schemeClr val="bg1"/>
-            </a:solidFill>
-          </a:ln>
-          <a:effectLst/>
-        </p:spPr>
-        <p:style>
-          <a:lnRef idx="1">
-            <a:schemeClr val="accent1"/>
-          </a:lnRef>
-          <a:fillRef idx="3">
-            <a:schemeClr val="accent1"/>
-          </a:fillRef>
-          <a:effectRef idx="2">
-            <a:schemeClr val="accent1"/>
-          </a:effectRef>
-          <a:fontRef idx="minor">
-            <a:schemeClr val="lt1"/>
-          </a:fontRef>
-        </p:style>
-        <p:txBody>
-          <a:bodyPr rtlCol="0" anchor="ctr"/>
-          <a:lstStyle/>
-          <a:p>
-            <a:pPr algn="ctr"/>
-            <a:endParaRPr lang="en-US"/>
-          </a:p>
-        </p:txBody>
-      </p:sp>
-      <p:sp>
-        <p:nvSpPr>
           <p:cNvPr id="21" name="Rectangle 20"/>
           <p:cNvSpPr/>
           <p:nvPr/>
@@ -6592,6 +5965,1081 @@
           <a:p>
             <a:pPr algn="ctr"/>
             <a:endParaRPr lang="en-US"/>
+          </a:p>
+        </p:txBody>
+      </p:sp>
+      <p:sp>
+        <p:nvSpPr>
+          <p:cNvPr id="18437" name="Text Box 22"/>
+          <p:cNvSpPr txBox="1">
+            <a:spLocks noChangeArrowheads="1"/>
+          </p:cNvSpPr>
+          <p:nvPr/>
+        </p:nvSpPr>
+        <p:spPr bwMode="auto">
+          <a:xfrm>
+            <a:off x="14014451" y="28688809"/>
+            <a:ext cx="27490298" cy="2139047"/>
+          </a:xfrm>
+          <a:prstGeom prst="rect">
+            <a:avLst/>
+          </a:prstGeom>
+          <a:noFill/>
+          <a:ln w="127000">
+            <a:noFill/>
+            <a:miter lim="800000"/>
+            <a:headEnd/>
+            <a:tailEnd/>
+          </a:ln>
+        </p:spPr>
+        <p:txBody>
+          <a:bodyPr wrap="square">
+            <a:spAutoFit/>
+          </a:bodyPr>
+          <a:lstStyle/>
+          <a:p>
+            <a:pPr eaLnBrk="1" hangingPunct="1"/>
+            <a:r>
+              <a:rPr lang="en-GB" b="1" dirty="0">
+                <a:latin typeface="Arial" panose="020B0604020202020204" pitchFamily="34" charset="0"/>
+                <a:cs typeface="Arial" pitchFamily="34" charset="0"/>
+              </a:rPr>
+              <a:t>Acknowledgements:</a:t>
+            </a:r>
+            <a:r>
+              <a:rPr lang="en-CA" b="1" dirty="0">
+                <a:latin typeface="Arial" panose="020B0604020202020204" pitchFamily="34" charset="0"/>
+                <a:cs typeface="Arial" pitchFamily="34" charset="0"/>
+              </a:rPr>
+              <a:t> </a:t>
+            </a:r>
+            <a:r>
+              <a:rPr lang="en-CA" dirty="0">
+                <a:latin typeface="Arial" panose="020B0604020202020204" pitchFamily="34" charset="0"/>
+                <a:cs typeface="Arial" pitchFamily="34" charset="0"/>
+              </a:rPr>
+              <a:t>This project was funded under the Summer Institutes in Biostatistics (SIBS) program of the National Heart, Lung, and Blood Institute grant # R25HL147236, with additional support from the Keck School of Medicine of USC, USC Norris Comprehensive Cancer Center grant # P30CA014089 </a:t>
+            </a:r>
+            <a:r>
+              <a:rPr lang="en-US" dirty="0">
+                <a:latin typeface="Arial" pitchFamily="34" charset="0"/>
+                <a:cs typeface="Arial" pitchFamily="34" charset="0"/>
+              </a:rPr>
+              <a:t>and National Institute of Environmental Health Sciences Center, grant # 5P30ES07048.</a:t>
+            </a:r>
+          </a:p>
+          <a:p>
+            <a:pPr algn="ctr" eaLnBrk="1" hangingPunct="1"/>
+            <a:endParaRPr lang="en-US" dirty="0">
+              <a:latin typeface="Arial" pitchFamily="34" charset="0"/>
+              <a:cs typeface="Arial" pitchFamily="34" charset="0"/>
+            </a:endParaRPr>
+          </a:p>
+          <a:p>
+            <a:pPr eaLnBrk="1" hangingPunct="1"/>
+            <a:r>
+              <a:rPr lang="en-US" b="1" dirty="0">
+                <a:latin typeface="Arial" panose="020B0604020202020204" pitchFamily="34" charset="0"/>
+                <a:cs typeface="Arial" pitchFamily="34" charset="0"/>
+              </a:rPr>
+              <a:t>Disclaimer: </a:t>
+            </a:r>
+            <a:r>
+              <a:rPr lang="en-US" dirty="0">
+                <a:latin typeface="Arial" panose="020B0604020202020204" pitchFamily="34" charset="0"/>
+                <a:cs typeface="Arial" pitchFamily="34" charset="0"/>
+              </a:rPr>
+              <a:t>Note that the results on this poster are based on a dataset that includes only a non-representative sample from the actual Southern California Children’s Health Study. Hence, it is solely intended for instructional purposes and should not be used to draw definitive (and substantively meaningful) conclusions about actual study objectives. </a:t>
+            </a:r>
+            <a:endParaRPr lang="en-GB" dirty="0">
+              <a:latin typeface="Arial" panose="020B0604020202020204" pitchFamily="34" charset="0"/>
+              <a:cs typeface="Arial" pitchFamily="34" charset="0"/>
+            </a:endParaRPr>
+          </a:p>
+          <a:p>
+            <a:pPr marL="479425" eaLnBrk="1" hangingPunct="1"/>
+            <a:endParaRPr lang="en-US" sz="800" b="1" dirty="0">
+              <a:latin typeface="Arial" pitchFamily="34" charset="0"/>
+            </a:endParaRPr>
+          </a:p>
+        </p:txBody>
+      </p:sp>
+      <p:grpSp>
+        <p:nvGrpSpPr>
+          <p:cNvPr id="29" name="Group 28">
+            <a:extLst>
+              <a:ext uri="{FF2B5EF4-FFF2-40B4-BE49-F238E27FC236}">
+                <a16:creationId xmlns:a16="http://schemas.microsoft.com/office/drawing/2014/main" id="{38E9E753-FC43-FC4C-A408-B09BD7981D79}"/>
+              </a:ext>
+            </a:extLst>
+          </p:cNvPr>
+          <p:cNvGrpSpPr/>
+          <p:nvPr/>
+        </p:nvGrpSpPr>
+        <p:grpSpPr>
+          <a:xfrm>
+            <a:off x="514106" y="17413963"/>
+            <a:ext cx="13200307" cy="13230135"/>
+            <a:chOff x="514106" y="17413963"/>
+            <a:chExt cx="13200307" cy="13230135"/>
+          </a:xfrm>
+          <a:noFill/>
+        </p:grpSpPr>
+        <p:sp>
+          <p:nvSpPr>
+            <p:cNvPr id="25" name="Rounded Rectangle 24">
+              <a:extLst>
+                <a:ext uri="{FF2B5EF4-FFF2-40B4-BE49-F238E27FC236}">
+                  <a16:creationId xmlns:a16="http://schemas.microsoft.com/office/drawing/2014/main" id="{00567BB7-800D-7D44-972B-D97256FA8E91}"/>
+                </a:ext>
+              </a:extLst>
+            </p:cNvPr>
+            <p:cNvSpPr/>
+            <p:nvPr/>
+          </p:nvSpPr>
+          <p:spPr>
+            <a:xfrm>
+              <a:off x="514106" y="17413963"/>
+              <a:ext cx="13200307" cy="13230135"/>
+            </a:xfrm>
+            <a:prstGeom prst="roundRect">
+              <a:avLst>
+                <a:gd name="adj" fmla="val 7564"/>
+              </a:avLst>
+            </a:prstGeom>
+            <a:grpFill/>
+            <a:ln>
+              <a:solidFill>
+                <a:schemeClr val="bg1">
+                  <a:lumMod val="75000"/>
+                </a:schemeClr>
+              </a:solidFill>
+            </a:ln>
+            <a:effectLst/>
+          </p:spPr>
+          <p:style>
+            <a:lnRef idx="1">
+              <a:schemeClr val="accent1"/>
+            </a:lnRef>
+            <a:fillRef idx="3">
+              <a:schemeClr val="accent1"/>
+            </a:fillRef>
+            <a:effectRef idx="2">
+              <a:schemeClr val="accent1"/>
+            </a:effectRef>
+            <a:fontRef idx="minor">
+              <a:schemeClr val="lt1"/>
+            </a:fontRef>
+          </p:style>
+          <p:txBody>
+            <a:bodyPr rtlCol="0" anchor="ctr"/>
+            <a:lstStyle/>
+            <a:p>
+              <a:pPr algn="ctr"/>
+              <a:endParaRPr lang="en-US" dirty="0">
+                <a:solidFill>
+                  <a:schemeClr val="tx1"/>
+                </a:solidFill>
+              </a:endParaRPr>
+            </a:p>
+          </p:txBody>
+        </p:sp>
+        <p:sp>
+          <p:nvSpPr>
+            <p:cNvPr id="33" name="Round Same Side Corner Rectangle 32">
+              <a:extLst>
+                <a:ext uri="{FF2B5EF4-FFF2-40B4-BE49-F238E27FC236}">
+                  <a16:creationId xmlns:a16="http://schemas.microsoft.com/office/drawing/2014/main" id="{D3490761-9862-814C-B9BF-BE4A7CD18E08}"/>
+                </a:ext>
+              </a:extLst>
+            </p:cNvPr>
+            <p:cNvSpPr/>
+            <p:nvPr/>
+          </p:nvSpPr>
+          <p:spPr>
+            <a:xfrm>
+              <a:off x="514106" y="17413963"/>
+              <a:ext cx="13200307" cy="1414920"/>
+            </a:xfrm>
+            <a:prstGeom prst="round2SameRect">
+              <a:avLst>
+                <a:gd name="adj1" fmla="val 50000"/>
+                <a:gd name="adj2" fmla="val 0"/>
+              </a:avLst>
+            </a:prstGeom>
+            <a:solidFill>
+              <a:schemeClr val="bg1">
+                <a:lumMod val="95000"/>
+              </a:schemeClr>
+            </a:solidFill>
+            <a:ln>
+              <a:solidFill>
+                <a:schemeClr val="bg1">
+                  <a:lumMod val="75000"/>
+                </a:schemeClr>
+              </a:solidFill>
+            </a:ln>
+            <a:effectLst/>
+          </p:spPr>
+          <p:style>
+            <a:lnRef idx="1">
+              <a:schemeClr val="accent1"/>
+            </a:lnRef>
+            <a:fillRef idx="3">
+              <a:schemeClr val="accent1"/>
+            </a:fillRef>
+            <a:effectRef idx="2">
+              <a:schemeClr val="accent1"/>
+            </a:effectRef>
+            <a:fontRef idx="minor">
+              <a:schemeClr val="lt1"/>
+            </a:fontRef>
+          </p:style>
+          <p:txBody>
+            <a:bodyPr rtlCol="0" anchor="ctr"/>
+            <a:lstStyle/>
+            <a:p>
+              <a:pPr algn="ctr"/>
+              <a:r>
+                <a:rPr lang="en-US" sz="3200" b="1" dirty="0">
+                  <a:solidFill>
+                    <a:schemeClr val="tx1"/>
+                  </a:solidFill>
+                </a:rPr>
+                <a:t>METHODS</a:t>
+              </a:r>
+            </a:p>
+          </p:txBody>
+        </p:sp>
+      </p:grpSp>
+      <p:grpSp>
+        <p:nvGrpSpPr>
+          <p:cNvPr id="41" name="Group 40">
+            <a:extLst>
+              <a:ext uri="{FF2B5EF4-FFF2-40B4-BE49-F238E27FC236}">
+                <a16:creationId xmlns:a16="http://schemas.microsoft.com/office/drawing/2014/main" id="{5D8F7295-9E99-5D45-8DD8-93BA2B29AA57}"/>
+              </a:ext>
+            </a:extLst>
+          </p:cNvPr>
+          <p:cNvGrpSpPr/>
+          <p:nvPr/>
+        </p:nvGrpSpPr>
+        <p:grpSpPr>
+          <a:xfrm>
+            <a:off x="512514" y="11352157"/>
+            <a:ext cx="13200307" cy="5612076"/>
+            <a:chOff x="514106" y="5334223"/>
+            <a:chExt cx="12085998" cy="5612076"/>
+          </a:xfrm>
+        </p:grpSpPr>
+        <p:sp>
+          <p:nvSpPr>
+            <p:cNvPr id="42" name="Rounded Rectangle 41">
+              <a:extLst>
+                <a:ext uri="{FF2B5EF4-FFF2-40B4-BE49-F238E27FC236}">
+                  <a16:creationId xmlns:a16="http://schemas.microsoft.com/office/drawing/2014/main" id="{D310E245-F756-E744-A576-4E8289B1BC8A}"/>
+                </a:ext>
+              </a:extLst>
+            </p:cNvPr>
+            <p:cNvSpPr/>
+            <p:nvPr/>
+          </p:nvSpPr>
+          <p:spPr>
+            <a:xfrm>
+              <a:off x="514106" y="5334223"/>
+              <a:ext cx="12085996" cy="5612076"/>
+            </a:xfrm>
+            <a:prstGeom prst="roundRect">
+              <a:avLst>
+                <a:gd name="adj" fmla="val 15063"/>
+              </a:avLst>
+            </a:prstGeom>
+            <a:noFill/>
+            <a:ln>
+              <a:solidFill>
+                <a:schemeClr val="bg1">
+                  <a:lumMod val="75000"/>
+                </a:schemeClr>
+              </a:solidFill>
+            </a:ln>
+            <a:effectLst/>
+          </p:spPr>
+          <p:style>
+            <a:lnRef idx="1">
+              <a:schemeClr val="accent1"/>
+            </a:lnRef>
+            <a:fillRef idx="3">
+              <a:schemeClr val="accent1"/>
+            </a:fillRef>
+            <a:effectRef idx="2">
+              <a:schemeClr val="accent1"/>
+            </a:effectRef>
+            <a:fontRef idx="minor">
+              <a:schemeClr val="lt1"/>
+            </a:fontRef>
+          </p:style>
+          <p:txBody>
+            <a:bodyPr rtlCol="0" anchor="ctr"/>
+            <a:lstStyle/>
+            <a:p>
+              <a:pPr algn="ctr"/>
+              <a:endParaRPr lang="en-US" dirty="0">
+                <a:solidFill>
+                  <a:schemeClr val="tx1"/>
+                </a:solidFill>
+              </a:endParaRPr>
+            </a:p>
+          </p:txBody>
+        </p:sp>
+        <p:sp>
+          <p:nvSpPr>
+            <p:cNvPr id="43" name="Round Same Side Corner Rectangle 42">
+              <a:extLst>
+                <a:ext uri="{FF2B5EF4-FFF2-40B4-BE49-F238E27FC236}">
+                  <a16:creationId xmlns:a16="http://schemas.microsoft.com/office/drawing/2014/main" id="{B3C42C9D-0218-8D4B-B7AF-349A11238F67}"/>
+                </a:ext>
+              </a:extLst>
+            </p:cNvPr>
+            <p:cNvSpPr/>
+            <p:nvPr/>
+          </p:nvSpPr>
+          <p:spPr>
+            <a:xfrm>
+              <a:off x="514107" y="5334223"/>
+              <a:ext cx="12085997" cy="1414920"/>
+            </a:xfrm>
+            <a:prstGeom prst="round2SameRect">
+              <a:avLst>
+                <a:gd name="adj1" fmla="val 50000"/>
+                <a:gd name="adj2" fmla="val 0"/>
+              </a:avLst>
+            </a:prstGeom>
+            <a:solidFill>
+              <a:schemeClr val="bg1">
+                <a:lumMod val="95000"/>
+              </a:schemeClr>
+            </a:solidFill>
+            <a:ln>
+              <a:solidFill>
+                <a:schemeClr val="bg1">
+                  <a:lumMod val="85000"/>
+                </a:schemeClr>
+              </a:solidFill>
+            </a:ln>
+            <a:effectLst/>
+          </p:spPr>
+          <p:style>
+            <a:lnRef idx="1">
+              <a:schemeClr val="accent1"/>
+            </a:lnRef>
+            <a:fillRef idx="3">
+              <a:schemeClr val="accent1"/>
+            </a:fillRef>
+            <a:effectRef idx="2">
+              <a:schemeClr val="accent1"/>
+            </a:effectRef>
+            <a:fontRef idx="minor">
+              <a:schemeClr val="lt1"/>
+            </a:fontRef>
+          </p:style>
+          <p:txBody>
+            <a:bodyPr rtlCol="0" anchor="ctr"/>
+            <a:lstStyle/>
+            <a:p>
+              <a:pPr algn="ctr"/>
+              <a:r>
+                <a:rPr lang="en-US" sz="3200" b="1" dirty="0">
+                  <a:solidFill>
+                    <a:schemeClr val="tx1"/>
+                  </a:solidFill>
+                </a:rPr>
+                <a:t>OBJECTIVES</a:t>
+              </a:r>
+            </a:p>
+          </p:txBody>
+        </p:sp>
+      </p:grpSp>
+      <p:grpSp>
+        <p:nvGrpSpPr>
+          <p:cNvPr id="48" name="Group 47">
+            <a:extLst>
+              <a:ext uri="{FF2B5EF4-FFF2-40B4-BE49-F238E27FC236}">
+                <a16:creationId xmlns:a16="http://schemas.microsoft.com/office/drawing/2014/main" id="{53311187-C1F6-5443-B6E3-C9C35B09FCA4}"/>
+              </a:ext>
+            </a:extLst>
+          </p:cNvPr>
+          <p:cNvGrpSpPr/>
+          <p:nvPr/>
+        </p:nvGrpSpPr>
+        <p:grpSpPr>
+          <a:xfrm>
+            <a:off x="557649" y="5337469"/>
+            <a:ext cx="13200307" cy="5612076"/>
+            <a:chOff x="514106" y="5334223"/>
+            <a:chExt cx="12085998" cy="5612076"/>
+          </a:xfrm>
+        </p:grpSpPr>
+        <p:sp>
+          <p:nvSpPr>
+            <p:cNvPr id="49" name="Rounded Rectangle 48">
+              <a:extLst>
+                <a:ext uri="{FF2B5EF4-FFF2-40B4-BE49-F238E27FC236}">
+                  <a16:creationId xmlns:a16="http://schemas.microsoft.com/office/drawing/2014/main" id="{C55D6079-B544-4F4C-8E7F-441BFC46169A}"/>
+                </a:ext>
+              </a:extLst>
+            </p:cNvPr>
+            <p:cNvSpPr/>
+            <p:nvPr/>
+          </p:nvSpPr>
+          <p:spPr>
+            <a:xfrm>
+              <a:off x="514106" y="5334223"/>
+              <a:ext cx="12085996" cy="5612076"/>
+            </a:xfrm>
+            <a:prstGeom prst="roundRect">
+              <a:avLst>
+                <a:gd name="adj" fmla="val 15063"/>
+              </a:avLst>
+            </a:prstGeom>
+            <a:noFill/>
+            <a:ln>
+              <a:solidFill>
+                <a:schemeClr val="bg1">
+                  <a:lumMod val="75000"/>
+                </a:schemeClr>
+              </a:solidFill>
+            </a:ln>
+            <a:effectLst/>
+          </p:spPr>
+          <p:style>
+            <a:lnRef idx="1">
+              <a:schemeClr val="accent1"/>
+            </a:lnRef>
+            <a:fillRef idx="3">
+              <a:schemeClr val="accent1"/>
+            </a:fillRef>
+            <a:effectRef idx="2">
+              <a:schemeClr val="accent1"/>
+            </a:effectRef>
+            <a:fontRef idx="minor">
+              <a:schemeClr val="lt1"/>
+            </a:fontRef>
+          </p:style>
+          <p:txBody>
+            <a:bodyPr rtlCol="0" anchor="ctr"/>
+            <a:lstStyle/>
+            <a:p>
+              <a:pPr algn="ctr"/>
+              <a:endParaRPr lang="en-US" dirty="0">
+                <a:solidFill>
+                  <a:schemeClr val="tx1"/>
+                </a:solidFill>
+              </a:endParaRPr>
+            </a:p>
+          </p:txBody>
+        </p:sp>
+        <p:sp>
+          <p:nvSpPr>
+            <p:cNvPr id="50" name="Round Same Side Corner Rectangle 49">
+              <a:extLst>
+                <a:ext uri="{FF2B5EF4-FFF2-40B4-BE49-F238E27FC236}">
+                  <a16:creationId xmlns:a16="http://schemas.microsoft.com/office/drawing/2014/main" id="{66E3FD7D-4E19-C442-83C3-77A8D739F180}"/>
+                </a:ext>
+              </a:extLst>
+            </p:cNvPr>
+            <p:cNvSpPr/>
+            <p:nvPr/>
+          </p:nvSpPr>
+          <p:spPr>
+            <a:xfrm>
+              <a:off x="514107" y="5334223"/>
+              <a:ext cx="12085997" cy="1414920"/>
+            </a:xfrm>
+            <a:prstGeom prst="round2SameRect">
+              <a:avLst>
+                <a:gd name="adj1" fmla="val 50000"/>
+                <a:gd name="adj2" fmla="val 0"/>
+              </a:avLst>
+            </a:prstGeom>
+            <a:solidFill>
+              <a:schemeClr val="bg1">
+                <a:lumMod val="95000"/>
+              </a:schemeClr>
+            </a:solidFill>
+            <a:ln>
+              <a:solidFill>
+                <a:schemeClr val="bg1">
+                  <a:lumMod val="85000"/>
+                </a:schemeClr>
+              </a:solidFill>
+            </a:ln>
+            <a:effectLst/>
+          </p:spPr>
+          <p:style>
+            <a:lnRef idx="1">
+              <a:schemeClr val="accent1"/>
+            </a:lnRef>
+            <a:fillRef idx="3">
+              <a:schemeClr val="accent1"/>
+            </a:fillRef>
+            <a:effectRef idx="2">
+              <a:schemeClr val="accent1"/>
+            </a:effectRef>
+            <a:fontRef idx="minor">
+              <a:schemeClr val="lt1"/>
+            </a:fontRef>
+          </p:style>
+          <p:txBody>
+            <a:bodyPr rtlCol="0" anchor="ctr"/>
+            <a:lstStyle/>
+            <a:p>
+              <a:pPr algn="ctr"/>
+              <a:r>
+                <a:rPr lang="en-US" sz="3200" b="1" dirty="0">
+                  <a:solidFill>
+                    <a:schemeClr val="tx1"/>
+                  </a:solidFill>
+                </a:rPr>
+                <a:t>KEY MESSAGES</a:t>
+              </a:r>
+            </a:p>
+          </p:txBody>
+        </p:sp>
+      </p:grpSp>
+      <p:grpSp>
+        <p:nvGrpSpPr>
+          <p:cNvPr id="51" name="Group 50">
+            <a:extLst>
+              <a:ext uri="{FF2B5EF4-FFF2-40B4-BE49-F238E27FC236}">
+                <a16:creationId xmlns:a16="http://schemas.microsoft.com/office/drawing/2014/main" id="{73229626-72D2-F045-858C-1E7F0AAED5D2}"/>
+              </a:ext>
+            </a:extLst>
+          </p:cNvPr>
+          <p:cNvGrpSpPr/>
+          <p:nvPr/>
+        </p:nvGrpSpPr>
+        <p:grpSpPr>
+          <a:xfrm>
+            <a:off x="14503150" y="7281028"/>
+            <a:ext cx="13200307" cy="18942232"/>
+            <a:chOff x="514106" y="17413963"/>
+            <a:chExt cx="13200307" cy="13230135"/>
+          </a:xfrm>
+        </p:grpSpPr>
+        <p:sp>
+          <p:nvSpPr>
+            <p:cNvPr id="52" name="Rounded Rectangle 51">
+              <a:extLst>
+                <a:ext uri="{FF2B5EF4-FFF2-40B4-BE49-F238E27FC236}">
+                  <a16:creationId xmlns:a16="http://schemas.microsoft.com/office/drawing/2014/main" id="{C296206B-4506-4A4A-9BF6-9A6F5306F1DE}"/>
+                </a:ext>
+              </a:extLst>
+            </p:cNvPr>
+            <p:cNvSpPr/>
+            <p:nvPr/>
+          </p:nvSpPr>
+          <p:spPr>
+            <a:xfrm>
+              <a:off x="514106" y="17413963"/>
+              <a:ext cx="13200307" cy="13230135"/>
+            </a:xfrm>
+            <a:prstGeom prst="roundRect">
+              <a:avLst>
+                <a:gd name="adj" fmla="val 7564"/>
+              </a:avLst>
+            </a:prstGeom>
+            <a:noFill/>
+            <a:ln>
+              <a:solidFill>
+                <a:schemeClr val="bg1">
+                  <a:lumMod val="75000"/>
+                </a:schemeClr>
+              </a:solidFill>
+            </a:ln>
+            <a:effectLst/>
+          </p:spPr>
+          <p:style>
+            <a:lnRef idx="1">
+              <a:schemeClr val="accent1"/>
+            </a:lnRef>
+            <a:fillRef idx="3">
+              <a:schemeClr val="accent1"/>
+            </a:fillRef>
+            <a:effectRef idx="2">
+              <a:schemeClr val="accent1"/>
+            </a:effectRef>
+            <a:fontRef idx="minor">
+              <a:schemeClr val="lt1"/>
+            </a:fontRef>
+          </p:style>
+          <p:txBody>
+            <a:bodyPr rtlCol="0" anchor="ctr"/>
+            <a:lstStyle/>
+            <a:p>
+              <a:pPr algn="ctr"/>
+              <a:endParaRPr lang="en-US" dirty="0">
+                <a:solidFill>
+                  <a:schemeClr val="tx1"/>
+                </a:solidFill>
+              </a:endParaRPr>
+            </a:p>
+          </p:txBody>
+        </p:sp>
+        <p:sp>
+          <p:nvSpPr>
+            <p:cNvPr id="53" name="Round Same Side Corner Rectangle 52">
+              <a:extLst>
+                <a:ext uri="{FF2B5EF4-FFF2-40B4-BE49-F238E27FC236}">
+                  <a16:creationId xmlns:a16="http://schemas.microsoft.com/office/drawing/2014/main" id="{BB9838B2-E3B7-8D42-8943-3C3A5696DB1A}"/>
+                </a:ext>
+              </a:extLst>
+            </p:cNvPr>
+            <p:cNvSpPr/>
+            <p:nvPr/>
+          </p:nvSpPr>
+          <p:spPr>
+            <a:xfrm>
+              <a:off x="514106" y="17413963"/>
+              <a:ext cx="13200307" cy="996490"/>
+            </a:xfrm>
+            <a:prstGeom prst="round2SameRect">
+              <a:avLst>
+                <a:gd name="adj1" fmla="val 50000"/>
+                <a:gd name="adj2" fmla="val 0"/>
+              </a:avLst>
+            </a:prstGeom>
+            <a:solidFill>
+              <a:schemeClr val="bg1">
+                <a:lumMod val="95000"/>
+              </a:schemeClr>
+            </a:solidFill>
+            <a:ln>
+              <a:solidFill>
+                <a:schemeClr val="bg1">
+                  <a:lumMod val="75000"/>
+                </a:schemeClr>
+              </a:solidFill>
+            </a:ln>
+            <a:effectLst/>
+          </p:spPr>
+          <p:style>
+            <a:lnRef idx="1">
+              <a:schemeClr val="accent1"/>
+            </a:lnRef>
+            <a:fillRef idx="3">
+              <a:schemeClr val="accent1"/>
+            </a:fillRef>
+            <a:effectRef idx="2">
+              <a:schemeClr val="accent1"/>
+            </a:effectRef>
+            <a:fontRef idx="minor">
+              <a:schemeClr val="lt1"/>
+            </a:fontRef>
+          </p:style>
+          <p:txBody>
+            <a:bodyPr rtlCol="0" anchor="ctr"/>
+            <a:lstStyle/>
+            <a:p>
+              <a:pPr algn="ctr"/>
+              <a:r>
+                <a:rPr lang="en-US" sz="3200" b="1" dirty="0">
+                  <a:solidFill>
+                    <a:schemeClr val="tx1"/>
+                  </a:solidFill>
+                </a:rPr>
+                <a:t>RESULTS</a:t>
+              </a:r>
+            </a:p>
+          </p:txBody>
+        </p:sp>
+      </p:grpSp>
+      <p:grpSp>
+        <p:nvGrpSpPr>
+          <p:cNvPr id="57" name="Group 56">
+            <a:extLst>
+              <a:ext uri="{FF2B5EF4-FFF2-40B4-BE49-F238E27FC236}">
+                <a16:creationId xmlns:a16="http://schemas.microsoft.com/office/drawing/2014/main" id="{497D9B81-86EB-D44F-B066-B77F95DA5154}"/>
+              </a:ext>
+            </a:extLst>
+          </p:cNvPr>
+          <p:cNvGrpSpPr/>
+          <p:nvPr/>
+        </p:nvGrpSpPr>
+        <p:grpSpPr>
+          <a:xfrm>
+            <a:off x="28405113" y="22075738"/>
+            <a:ext cx="13200307" cy="5612076"/>
+            <a:chOff x="514106" y="5334223"/>
+            <a:chExt cx="12085998" cy="5612076"/>
+          </a:xfrm>
+        </p:grpSpPr>
+        <p:sp>
+          <p:nvSpPr>
+            <p:cNvPr id="58" name="Rounded Rectangle 57">
+              <a:extLst>
+                <a:ext uri="{FF2B5EF4-FFF2-40B4-BE49-F238E27FC236}">
+                  <a16:creationId xmlns:a16="http://schemas.microsoft.com/office/drawing/2014/main" id="{3F5312C5-C223-BD4A-A5AA-ED323AE74F1A}"/>
+                </a:ext>
+              </a:extLst>
+            </p:cNvPr>
+            <p:cNvSpPr/>
+            <p:nvPr/>
+          </p:nvSpPr>
+          <p:spPr>
+            <a:xfrm>
+              <a:off x="514106" y="5334223"/>
+              <a:ext cx="12085996" cy="5612076"/>
+            </a:xfrm>
+            <a:prstGeom prst="roundRect">
+              <a:avLst>
+                <a:gd name="adj" fmla="val 15063"/>
+              </a:avLst>
+            </a:prstGeom>
+            <a:noFill/>
+            <a:ln>
+              <a:solidFill>
+                <a:schemeClr val="bg1">
+                  <a:lumMod val="75000"/>
+                </a:schemeClr>
+              </a:solidFill>
+            </a:ln>
+            <a:effectLst/>
+          </p:spPr>
+          <p:style>
+            <a:lnRef idx="1">
+              <a:schemeClr val="accent1"/>
+            </a:lnRef>
+            <a:fillRef idx="3">
+              <a:schemeClr val="accent1"/>
+            </a:fillRef>
+            <a:effectRef idx="2">
+              <a:schemeClr val="accent1"/>
+            </a:effectRef>
+            <a:fontRef idx="minor">
+              <a:schemeClr val="lt1"/>
+            </a:fontRef>
+          </p:style>
+          <p:txBody>
+            <a:bodyPr rtlCol="0" anchor="ctr"/>
+            <a:lstStyle/>
+            <a:p>
+              <a:pPr algn="ctr"/>
+              <a:endParaRPr lang="en-US" dirty="0">
+                <a:solidFill>
+                  <a:schemeClr val="tx1"/>
+                </a:solidFill>
+              </a:endParaRPr>
+            </a:p>
+          </p:txBody>
+        </p:sp>
+        <p:sp>
+          <p:nvSpPr>
+            <p:cNvPr id="59" name="Round Same Side Corner Rectangle 58">
+              <a:extLst>
+                <a:ext uri="{FF2B5EF4-FFF2-40B4-BE49-F238E27FC236}">
+                  <a16:creationId xmlns:a16="http://schemas.microsoft.com/office/drawing/2014/main" id="{188F1DC7-D3DB-F249-8CA9-14D04B1EB26A}"/>
+                </a:ext>
+              </a:extLst>
+            </p:cNvPr>
+            <p:cNvSpPr/>
+            <p:nvPr/>
+          </p:nvSpPr>
+          <p:spPr>
+            <a:xfrm>
+              <a:off x="514107" y="5334223"/>
+              <a:ext cx="12085997" cy="1414920"/>
+            </a:xfrm>
+            <a:prstGeom prst="round2SameRect">
+              <a:avLst>
+                <a:gd name="adj1" fmla="val 50000"/>
+                <a:gd name="adj2" fmla="val 0"/>
+              </a:avLst>
+            </a:prstGeom>
+            <a:solidFill>
+              <a:schemeClr val="bg1">
+                <a:lumMod val="95000"/>
+              </a:schemeClr>
+            </a:solidFill>
+            <a:ln>
+              <a:solidFill>
+                <a:schemeClr val="bg1">
+                  <a:lumMod val="85000"/>
+                </a:schemeClr>
+              </a:solidFill>
+            </a:ln>
+            <a:effectLst/>
+          </p:spPr>
+          <p:style>
+            <a:lnRef idx="1">
+              <a:schemeClr val="accent1"/>
+            </a:lnRef>
+            <a:fillRef idx="3">
+              <a:schemeClr val="accent1"/>
+            </a:fillRef>
+            <a:effectRef idx="2">
+              <a:schemeClr val="accent1"/>
+            </a:effectRef>
+            <a:fontRef idx="minor">
+              <a:schemeClr val="lt1"/>
+            </a:fontRef>
+          </p:style>
+          <p:txBody>
+            <a:bodyPr rtlCol="0" anchor="ctr"/>
+            <a:lstStyle/>
+            <a:p>
+              <a:pPr algn="ctr"/>
+              <a:r>
+                <a:rPr lang="en-US" sz="3200" b="1" dirty="0">
+                  <a:solidFill>
+                    <a:schemeClr val="tx1"/>
+                  </a:solidFill>
+                </a:rPr>
+                <a:t>DISCUSSION</a:t>
+              </a:r>
+            </a:p>
+          </p:txBody>
+        </p:sp>
+      </p:grpSp>
+      <p:grpSp>
+        <p:nvGrpSpPr>
+          <p:cNvPr id="60" name="Group 59">
+            <a:extLst>
+              <a:ext uri="{FF2B5EF4-FFF2-40B4-BE49-F238E27FC236}">
+                <a16:creationId xmlns:a16="http://schemas.microsoft.com/office/drawing/2014/main" id="{5738D7C4-ED1B-9449-BA12-368BD88F5356}"/>
+              </a:ext>
+            </a:extLst>
+          </p:cNvPr>
+          <p:cNvGrpSpPr/>
+          <p:nvPr/>
+        </p:nvGrpSpPr>
+        <p:grpSpPr>
+          <a:xfrm>
+            <a:off x="28405113" y="5712695"/>
+            <a:ext cx="13243846" cy="15310834"/>
+            <a:chOff x="514106" y="5334223"/>
+            <a:chExt cx="12125862" cy="5612076"/>
+          </a:xfrm>
+        </p:grpSpPr>
+        <p:sp>
+          <p:nvSpPr>
+            <p:cNvPr id="61" name="Rounded Rectangle 60">
+              <a:extLst>
+                <a:ext uri="{FF2B5EF4-FFF2-40B4-BE49-F238E27FC236}">
+                  <a16:creationId xmlns:a16="http://schemas.microsoft.com/office/drawing/2014/main" id="{34A508A2-528D-1C42-A49E-89E1EFD9F2CB}"/>
+                </a:ext>
+              </a:extLst>
+            </p:cNvPr>
+            <p:cNvSpPr/>
+            <p:nvPr/>
+          </p:nvSpPr>
+          <p:spPr>
+            <a:xfrm>
+              <a:off x="514106" y="5334223"/>
+              <a:ext cx="12085996" cy="5612076"/>
+            </a:xfrm>
+            <a:prstGeom prst="roundRect">
+              <a:avLst>
+                <a:gd name="adj" fmla="val 7146"/>
+              </a:avLst>
+            </a:prstGeom>
+            <a:noFill/>
+            <a:ln>
+              <a:solidFill>
+                <a:schemeClr val="bg1">
+                  <a:lumMod val="75000"/>
+                </a:schemeClr>
+              </a:solidFill>
+            </a:ln>
+            <a:effectLst/>
+          </p:spPr>
+          <p:style>
+            <a:lnRef idx="1">
+              <a:schemeClr val="accent1"/>
+            </a:lnRef>
+            <a:fillRef idx="3">
+              <a:schemeClr val="accent1"/>
+            </a:fillRef>
+            <a:effectRef idx="2">
+              <a:schemeClr val="accent1"/>
+            </a:effectRef>
+            <a:fontRef idx="minor">
+              <a:schemeClr val="lt1"/>
+            </a:fontRef>
+          </p:style>
+          <p:txBody>
+            <a:bodyPr rtlCol="0" anchor="ctr"/>
+            <a:lstStyle/>
+            <a:p>
+              <a:pPr algn="ctr"/>
+              <a:endParaRPr lang="en-US" dirty="0">
+                <a:solidFill>
+                  <a:schemeClr val="tx1"/>
+                </a:solidFill>
+              </a:endParaRPr>
+            </a:p>
+          </p:txBody>
+        </p:sp>
+        <p:sp>
+          <p:nvSpPr>
+            <p:cNvPr id="62" name="Round Same Side Corner Rectangle 61">
+              <a:extLst>
+                <a:ext uri="{FF2B5EF4-FFF2-40B4-BE49-F238E27FC236}">
+                  <a16:creationId xmlns:a16="http://schemas.microsoft.com/office/drawing/2014/main" id="{27CC3257-746C-F84B-94B1-9DC609125B67}"/>
+                </a:ext>
+              </a:extLst>
+            </p:cNvPr>
+            <p:cNvSpPr/>
+            <p:nvPr/>
+          </p:nvSpPr>
+          <p:spPr>
+            <a:xfrm>
+              <a:off x="553971" y="5334223"/>
+              <a:ext cx="12085997" cy="574861"/>
+            </a:xfrm>
+            <a:prstGeom prst="round2SameRect">
+              <a:avLst>
+                <a:gd name="adj1" fmla="val 50000"/>
+                <a:gd name="adj2" fmla="val 0"/>
+              </a:avLst>
+            </a:prstGeom>
+            <a:solidFill>
+              <a:schemeClr val="bg1">
+                <a:lumMod val="95000"/>
+              </a:schemeClr>
+            </a:solidFill>
+            <a:ln>
+              <a:solidFill>
+                <a:schemeClr val="bg1">
+                  <a:lumMod val="85000"/>
+                </a:schemeClr>
+              </a:solidFill>
+            </a:ln>
+            <a:effectLst/>
+          </p:spPr>
+          <p:style>
+            <a:lnRef idx="1">
+              <a:schemeClr val="accent1"/>
+            </a:lnRef>
+            <a:fillRef idx="3">
+              <a:schemeClr val="accent1"/>
+            </a:fillRef>
+            <a:effectRef idx="2">
+              <a:schemeClr val="accent1"/>
+            </a:effectRef>
+            <a:fontRef idx="minor">
+              <a:schemeClr val="lt1"/>
+            </a:fontRef>
+          </p:style>
+          <p:txBody>
+            <a:bodyPr rtlCol="0" anchor="ctr"/>
+            <a:lstStyle/>
+            <a:p>
+              <a:pPr algn="ctr"/>
+              <a:r>
+                <a:rPr lang="en-US" sz="3200" b="1" dirty="0">
+                  <a:solidFill>
+                    <a:schemeClr val="tx1"/>
+                  </a:solidFill>
+                </a:rPr>
+                <a:t>RESULTS (Cont.)</a:t>
+              </a:r>
+            </a:p>
+          </p:txBody>
+        </p:sp>
+      </p:grpSp>
+      <p:sp>
+        <p:nvSpPr>
+          <p:cNvPr id="64" name="Text Box 2">
+            <a:extLst>
+              <a:ext uri="{FF2B5EF4-FFF2-40B4-BE49-F238E27FC236}">
+                <a16:creationId xmlns:a16="http://schemas.microsoft.com/office/drawing/2014/main" id="{ADC3BE07-6C49-0A46-8562-052A4E8D8573}"/>
+              </a:ext>
+            </a:extLst>
+          </p:cNvPr>
+          <p:cNvSpPr txBox="1">
+            <a:spLocks noChangeArrowheads="1"/>
+          </p:cNvSpPr>
+          <p:nvPr/>
+        </p:nvSpPr>
+        <p:spPr bwMode="auto">
+          <a:xfrm>
+            <a:off x="5759731" y="1208002"/>
+            <a:ext cx="31594425" cy="2780248"/>
+          </a:xfrm>
+          <a:prstGeom prst="rect">
+            <a:avLst/>
+          </a:prstGeom>
+          <a:noFill/>
+          <a:ln w="9525">
+            <a:noFill/>
+            <a:miter lim="800000"/>
+            <a:headEnd/>
+            <a:tailEnd/>
+          </a:ln>
+        </p:spPr>
+        <p:txBody>
+          <a:bodyPr>
+            <a:spAutoFit/>
+          </a:bodyPr>
+          <a:lstStyle/>
+          <a:p>
+            <a:pPr algn="ctr" eaLnBrk="1" hangingPunct="1"/>
+            <a:r>
+              <a:rPr lang="en-US" sz="6000" b="1" dirty="0">
+                <a:solidFill>
+                  <a:schemeClr val="bg1"/>
+                </a:solidFill>
+                <a:latin typeface="Tahoma" pitchFamily="34" charset="0"/>
+                <a:cs typeface="Tahoma" pitchFamily="34" charset="0"/>
+              </a:rPr>
+              <a:t>Title</a:t>
+            </a:r>
+          </a:p>
+          <a:p>
+            <a:pPr algn="ctr" eaLnBrk="1" hangingPunct="1"/>
+            <a:r>
+              <a:rPr lang="en-US" sz="4800" b="1" dirty="0">
+                <a:solidFill>
+                  <a:schemeClr val="bg1"/>
+                </a:solidFill>
+                <a:latin typeface="Tahoma" pitchFamily="34" charset="0"/>
+              </a:rPr>
+              <a:t>Author List</a:t>
+            </a:r>
+            <a:endParaRPr lang="en-US" sz="4800" b="1" baseline="30000" dirty="0">
+              <a:solidFill>
+                <a:schemeClr val="bg1"/>
+              </a:solidFill>
+              <a:latin typeface="Tahoma" pitchFamily="34" charset="0"/>
+            </a:endParaRPr>
+          </a:p>
+          <a:p>
+            <a:pPr algn="ctr" eaLnBrk="1" hangingPunct="1"/>
+            <a:endParaRPr lang="en-US" sz="4000" b="1" baseline="30000" dirty="0">
+              <a:solidFill>
+                <a:schemeClr val="bg1"/>
+              </a:solidFill>
+              <a:latin typeface="Tahoma" pitchFamily="34" charset="0"/>
+            </a:endParaRPr>
+          </a:p>
+          <a:p>
+            <a:pPr algn="ctr" eaLnBrk="1" hangingPunct="1"/>
+            <a:r>
+              <a:rPr lang="en-US" sz="4000" b="1" dirty="0">
+                <a:solidFill>
+                  <a:schemeClr val="bg1"/>
+                </a:solidFill>
+                <a:latin typeface="Tahoma" pitchFamily="34" charset="0"/>
+              </a:rPr>
+              <a:t>Keck School of Medicine of USC, University of Southern California, Los Angeles, CA</a:t>
+            </a:r>
+            <a:endParaRPr lang="en-US" sz="4000" b="1" dirty="0">
+              <a:solidFill>
+                <a:schemeClr val="bg1"/>
+              </a:solidFill>
+              <a:latin typeface="Tahoma" pitchFamily="34" charset="0"/>
+              <a:cs typeface="Tahoma" pitchFamily="34" charset="0"/>
+            </a:endParaRPr>
           </a:p>
         </p:txBody>
       </p:sp>

</xml_diff>